<commit_message>
lecture 2 material upload
</commit_message>
<xml_diff>
--- a/lecture slides/Lecture 1 - Introduction.pptx
+++ b/lecture slides/Lecture 1 - Introduction.pptx
@@ -318,7 +318,7 @@
               <a:pPr>
                 <a:defRPr/>
               </a:pPr>
-              <a:t>10/11/2020</a:t>
+              <a:t>10/13/2020</a:t>
             </a:fld>
             <a:endParaRPr lang="en-US"/>
           </a:p>
@@ -4016,7 +4016,7 @@
               <a:pPr>
                 <a:defRPr/>
               </a:pPr>
-              <a:t>10/11/2020</a:t>
+              <a:t>10/13/2020</a:t>
             </a:fld>
             <a:endParaRPr lang="en-US"/>
           </a:p>
@@ -4208,7 +4208,7 @@
               <a:pPr>
                 <a:defRPr/>
               </a:pPr>
-              <a:t>10/11/2020</a:t>
+              <a:t>10/13/2020</a:t>
             </a:fld>
             <a:endParaRPr lang="en-US"/>
           </a:p>
@@ -4410,7 +4410,7 @@
               <a:pPr>
                 <a:defRPr/>
               </a:pPr>
-              <a:t>10/11/2020</a:t>
+              <a:t>10/13/2020</a:t>
             </a:fld>
             <a:endParaRPr lang="en-US"/>
           </a:p>
@@ -4878,7 +4878,7 @@
               <a:pPr>
                 <a:defRPr/>
               </a:pPr>
-              <a:t>10/11/2020</a:t>
+              <a:t>10/13/2020</a:t>
             </a:fld>
             <a:endParaRPr lang="en-US"/>
           </a:p>
@@ -5146,7 +5146,7 @@
               <a:pPr>
                 <a:defRPr/>
               </a:pPr>
-              <a:t>10/11/2020</a:t>
+              <a:t>10/13/2020</a:t>
             </a:fld>
             <a:endParaRPr lang="en-US"/>
           </a:p>
@@ -5456,7 +5456,7 @@
               <a:pPr>
                 <a:defRPr/>
               </a:pPr>
-              <a:t>10/11/2020</a:t>
+              <a:t>10/13/2020</a:t>
             </a:fld>
             <a:endParaRPr lang="en-US"/>
           </a:p>
@@ -5900,7 +5900,7 @@
               <a:pPr>
                 <a:defRPr/>
               </a:pPr>
-              <a:t>10/11/2020</a:t>
+              <a:t>10/13/2020</a:t>
             </a:fld>
             <a:endParaRPr lang="en-US"/>
           </a:p>
@@ -6040,7 +6040,7 @@
               <a:pPr>
                 <a:defRPr/>
               </a:pPr>
-              <a:t>10/11/2020</a:t>
+              <a:t>10/13/2020</a:t>
             </a:fld>
             <a:endParaRPr lang="en-US"/>
           </a:p>
@@ -6157,7 +6157,7 @@
               <a:pPr>
                 <a:defRPr/>
               </a:pPr>
-              <a:t>10/11/2020</a:t>
+              <a:t>10/13/2020</a:t>
             </a:fld>
             <a:endParaRPr lang="en-US"/>
           </a:p>
@@ -6456,7 +6456,7 @@
               <a:pPr>
                 <a:defRPr/>
               </a:pPr>
-              <a:t>10/11/2020</a:t>
+              <a:t>10/13/2020</a:t>
             </a:fld>
             <a:endParaRPr lang="en-US"/>
           </a:p>
@@ -6734,7 +6734,7 @@
               <a:pPr>
                 <a:defRPr/>
               </a:pPr>
-              <a:t>10/11/2020</a:t>
+              <a:t>10/13/2020</a:t>
             </a:fld>
             <a:endParaRPr lang="en-US"/>
           </a:p>
@@ -7019,7 +7019,7 @@
               <a:pPr>
                 <a:defRPr/>
               </a:pPr>
-              <a:t>10/11/2020</a:t>
+              <a:t>10/13/2020</a:t>
             </a:fld>
             <a:endParaRPr lang="en-US"/>
           </a:p>
@@ -7842,27 +7842,7 @@
                 <a:latin typeface="Times New Roman"/>
                 <a:cs typeface="Times New Roman"/>
               </a:rPr>
-              <a:t>Based </a:t>
-            </a:r>
-            <a:r>
-              <a:rPr lang="en-US" sz="3200" i="1" spc="-45" dirty="0" smtClean="0">
-                <a:solidFill>
-                  <a:srgbClr val="808080"/>
-                </a:solidFill>
-                <a:latin typeface="Times New Roman"/>
-                <a:cs typeface="Times New Roman"/>
-              </a:rPr>
-              <a:t>on Asst</a:t>
-            </a:r>
-            <a:r>
-              <a:rPr lang="en-US" sz="3200" i="1" spc="-45" dirty="0">
-                <a:solidFill>
-                  <a:srgbClr val="808080"/>
-                </a:solidFill>
-                <a:latin typeface="Times New Roman"/>
-                <a:cs typeface="Times New Roman"/>
-              </a:rPr>
-              <a:t>. Prof. Dr. </a:t>
+              <a:t>Composed from Asst. Prof. Dr. </a:t>
             </a:r>
             <a:r>
               <a:rPr lang="en-US" sz="3200" i="1" spc="-45" dirty="0" err="1">
@@ -7905,24 +7885,14 @@
               <a:t> </a:t>
             </a:r>
             <a:r>
-              <a:rPr lang="en-US" sz="3200" i="1" spc="-45" dirty="0" err="1" smtClean="0">
+              <a:rPr lang="en-US" sz="3200" i="1" spc="-45" dirty="0" err="1">
                 <a:solidFill>
                   <a:srgbClr val="808080"/>
                 </a:solidFill>
                 <a:latin typeface="Times New Roman"/>
                 <a:cs typeface="Times New Roman"/>
               </a:rPr>
-              <a:t>M</a:t>
-            </a:r>
-            <a:r>
-              <a:rPr lang="en-US" sz="3200" i="1" spc="-45" dirty="0" err="1">
-                <a:solidFill>
-                  <a:srgbClr val="808080"/>
-                </a:solidFill>
-                <a:latin typeface="Times New Roman"/>
-                <a:cs typeface="Times New Roman"/>
-              </a:rPr>
-              <a:t>etin’s</a:t>
+              <a:t>Metin’s</a:t>
             </a:r>
             <a:r>
               <a:rPr lang="en-US" sz="3200" i="1" spc="-45" dirty="0">
@@ -7934,6 +7904,13 @@
               </a:rPr>
               <a:t> Resources</a:t>
             </a:r>
+            <a:endParaRPr lang="en-US" sz="3200" i="1" spc="-45" dirty="0">
+              <a:solidFill>
+                <a:srgbClr val="808080"/>
+              </a:solidFill>
+              <a:latin typeface="Times New Roman"/>
+              <a:cs typeface="Times New Roman"/>
+            </a:endParaRPr>
           </a:p>
         </p:txBody>
       </p:sp>
@@ -8128,17 +8105,7 @@
                 <a:latin typeface="Arial"/>
                 <a:cs typeface="Arial"/>
               </a:rPr>
-              <a:t>CSE419 – Artificial Intelligence and Machine Learning </a:t>
-            </a:r>
-            <a:r>
-              <a:rPr lang="en-US" sz="4400" spc="-265" dirty="0" smtClean="0">
-                <a:solidFill>
-                  <a:srgbClr val="000000"/>
-                </a:solidFill>
-                <a:latin typeface="Arial"/>
-                <a:cs typeface="Arial"/>
-              </a:rPr>
-              <a:t>2020</a:t>
+              <a:t>CSE419 – Artificial Intelligence and Machine Learning 2020</a:t>
             </a:r>
             <a:r>
               <a:rPr lang="en-US" sz="4800" spc="-265" dirty="0" smtClean="0">
@@ -8261,6 +8228,62 @@
                 <a:srgbClr val="0070C0"/>
               </a:solidFill>
               <a:latin typeface="Sitka Small" panose="02000505000000020004" pitchFamily="2" charset="0"/>
+              <a:cs typeface="Courier New" panose="02070309020205020404" pitchFamily="49" charset="0"/>
+            </a:endParaRPr>
+          </a:p>
+        </p:txBody>
+      </p:sp>
+      <p:sp>
+        <p:nvSpPr>
+          <p:cNvPr id="9" name="Metin kutusu 8"/>
+          <p:cNvSpPr txBox="1"/>
+          <p:nvPr/>
+        </p:nvSpPr>
+        <p:spPr>
+          <a:xfrm>
+            <a:off x="266700" y="6358074"/>
+            <a:ext cx="8686800" cy="400110"/>
+          </a:xfrm>
+          <a:prstGeom prst="rect">
+            <a:avLst/>
+          </a:prstGeom>
+          <a:noFill/>
+        </p:spPr>
+        <p:txBody>
+          <a:bodyPr wrap="square" rtlCol="0">
+            <a:spAutoFit/>
+          </a:bodyPr>
+          <a:lstStyle/>
+          <a:p>
+            <a:r>
+              <a:rPr lang="en-US" sz="2000" spc="-265" dirty="0">
+                <a:solidFill>
+                  <a:srgbClr val="000000"/>
+                </a:solidFill>
+                <a:latin typeface="Courier New" panose="02070309020205020404" pitchFamily="49" charset="0"/>
+                <a:ea typeface="+mj-ea"/>
+                <a:cs typeface="Courier New" panose="02070309020205020404" pitchFamily="49" charset="0"/>
+              </a:rPr>
+              <a:t>Source: </a:t>
+            </a:r>
+            <a:r>
+              <a:rPr lang="en-US" sz="2000" spc="-265" dirty="0">
+                <a:solidFill>
+                  <a:srgbClr val="000000"/>
+                </a:solidFill>
+                <a:latin typeface="Courier New" panose="02070309020205020404" pitchFamily="49" charset="0"/>
+                <a:ea typeface="+mj-ea"/>
+                <a:cs typeface="Courier New" panose="02070309020205020404" pitchFamily="49" charset="0"/>
+                <a:hlinkClick r:id="rId4"/>
+              </a:rPr>
+              <a:t>https://cs.pomona.edu/~dkauchak/classes/f13/cs451-f13/lectures/</a:t>
+            </a:r>
+            <a:endParaRPr lang="tr-TR" sz="2000" spc="-265" dirty="0">
+              <a:solidFill>
+                <a:srgbClr val="000000"/>
+              </a:solidFill>
+              <a:latin typeface="Courier New" panose="02070309020205020404" pitchFamily="49" charset="0"/>
+              <a:ea typeface="+mj-ea"/>
               <a:cs typeface="Courier New" panose="02070309020205020404" pitchFamily="49" charset="0"/>
             </a:endParaRPr>
           </a:p>
@@ -9254,7 +9277,7 @@
           <a:graphicData uri="http://schemas.openxmlformats.org/presentationml/2006/ole">
             <mc:AlternateContent xmlns:mc="http://schemas.openxmlformats.org/markup-compatibility/2006">
               <mc:Choice xmlns:v="urn:schemas-microsoft-com:vml" Requires="v">
-                <p:oleObj spid="_x0000_s1083" name="Image" r:id="rId4" imgW="5244444" imgH="2044444" progId="Photoshop.Image.7">
+                <p:oleObj spid="_x0000_s1084" name="Image" r:id="rId4" imgW="5244444" imgH="2044444" progId="Photoshop.Image.7">
                   <p:embed/>
                 </p:oleObj>
               </mc:Choice>
@@ -28948,7 +28971,7 @@
           <a:graphicData uri="http://schemas.openxmlformats.org/presentationml/2006/ole">
             <mc:AlternateContent xmlns:mc="http://schemas.openxmlformats.org/markup-compatibility/2006">
               <mc:Choice xmlns:v="urn:schemas-microsoft-com:vml" Requires="v">
-                <p:oleObj spid="_x0000_s2103" name="MS Org Chart" r:id="rId3" imgW="7772400" imgH="2057400" progId="OrgPlusWOPX.4">
+                <p:oleObj spid="_x0000_s2104" name="MS Org Chart" r:id="rId3" imgW="7772400" imgH="2057400" progId="OrgPlusWOPX.4">
                   <p:embed followColorScheme="full"/>
                 </p:oleObj>
               </mc:Choice>
@@ -29252,7 +29275,7 @@
           <a:graphicData uri="http://schemas.openxmlformats.org/presentationml/2006/ole">
             <mc:AlternateContent xmlns:mc="http://schemas.openxmlformats.org/markup-compatibility/2006">
               <mc:Choice xmlns:v="urn:schemas-microsoft-com:vml" Requires="v">
-                <p:oleObj spid="_x0000_s3126" name="Document" r:id="rId4" imgW="7772400" imgH="4716360" progId="Word.Document.6">
+                <p:oleObj spid="_x0000_s3127" name="Document" r:id="rId4" imgW="7772400" imgH="4716360" progId="Word.Document.6">
                   <p:embed/>
                 </p:oleObj>
               </mc:Choice>
@@ -36399,7 +36422,7 @@
           <a:graphicData uri="http://schemas.openxmlformats.org/presentationml/2006/ole">
             <mc:AlternateContent xmlns:mc="http://schemas.openxmlformats.org/markup-compatibility/2006">
               <mc:Choice xmlns:v="urn:schemas-microsoft-com:vml" Requires="v">
-                <p:oleObj spid="_x0000_s4152" name="Microsoft Drawing" r:id="rId3" imgW="3962160" imgH="1765080" progId="MSDraw">
+                <p:oleObj spid="_x0000_s4153" name="Microsoft Drawing" r:id="rId3" imgW="3962160" imgH="1765080" progId="MSDraw">
                   <p:embed/>
                 </p:oleObj>
               </mc:Choice>

</xml_diff>